<commit_message>
Waarom een tool added to powerpoint
</commit_message>
<xml_diff>
--- a/Les1/Wat is Data Science.pptx
+++ b/Les1/Wat is Data Science.pptx
@@ -8,6 +8,7 @@
     <p:sldId id="257" r:id="rId2"/>
     <p:sldId id="259" r:id="rId3"/>
     <p:sldId id="258" r:id="rId4"/>
+    <p:sldId id="260" r:id="rId5"/>
   </p:sldIdLst>
   <p:sldSz cx="12192000" cy="6858000"/>
   <p:notesSz cx="6858000" cy="9144000"/>
@@ -7234,6 +7235,128 @@
 </p:sld>
 </file>
 
+<file path=ppt/slides/slide4.xml><?xml version="1.0" encoding="utf-8"?>
+<p:sld xmlns:a="http://schemas.openxmlformats.org/drawingml/2006/main" xmlns:r="http://schemas.openxmlformats.org/officeDocument/2006/relationships" xmlns:p="http://schemas.openxmlformats.org/presentationml/2006/main">
+  <p:cSld>
+    <p:spTree>
+      <p:nvGrpSpPr>
+        <p:cNvPr id="1" name=""/>
+        <p:cNvGrpSpPr/>
+        <p:nvPr/>
+      </p:nvGrpSpPr>
+      <p:grpSpPr>
+        <a:xfrm>
+          <a:off x="0" y="0"/>
+          <a:ext cx="0" cy="0"/>
+          <a:chOff x="0" y="0"/>
+          <a:chExt cx="0" cy="0"/>
+        </a:xfrm>
+      </p:grpSpPr>
+      <p:sp>
+        <p:nvSpPr>
+          <p:cNvPr id="2" name="Titel 1">
+            <a:extLst>
+              <a:ext uri="{FF2B5EF4-FFF2-40B4-BE49-F238E27FC236}">
+                <a16:creationId xmlns:a16="http://schemas.microsoft.com/office/drawing/2014/main" id="{5FCB4818-441C-42AE-A800-6BA5EEB5038F}"/>
+              </a:ext>
+            </a:extLst>
+          </p:cNvPr>
+          <p:cNvSpPr>
+            <a:spLocks noGrp="1"/>
+          </p:cNvSpPr>
+          <p:nvPr>
+            <p:ph type="title"/>
+          </p:nvPr>
+        </p:nvSpPr>
+        <p:spPr/>
+        <p:txBody>
+          <a:bodyPr/>
+          <a:lstStyle/>
+          <a:p>
+            <a:r>
+              <a:rPr lang="nl-NL" cap="none" dirty="0"/>
+              <a:t>Waarom een bepaalde tool gebruiken?</a:t>
+            </a:r>
+          </a:p>
+        </p:txBody>
+      </p:sp>
+      <p:sp>
+        <p:nvSpPr>
+          <p:cNvPr id="3" name="Tijdelijke aanduiding voor inhoud 2">
+            <a:extLst>
+              <a:ext uri="{FF2B5EF4-FFF2-40B4-BE49-F238E27FC236}">
+                <a16:creationId xmlns:a16="http://schemas.microsoft.com/office/drawing/2014/main" id="{6A03D460-C911-4E7F-B42B-FDA72B3D8E14}"/>
+              </a:ext>
+            </a:extLst>
+          </p:cNvPr>
+          <p:cNvSpPr>
+            <a:spLocks noGrp="1"/>
+          </p:cNvSpPr>
+          <p:nvPr>
+            <p:ph idx="1"/>
+          </p:nvPr>
+        </p:nvSpPr>
+        <p:spPr/>
+        <p:txBody>
+          <a:bodyPr/>
+          <a:lstStyle/>
+          <a:p>
+            <a:r>
+              <a:rPr lang="nl-NL" dirty="0"/>
+              <a:t>Open-source</a:t>
+            </a:r>
+          </a:p>
+          <a:p>
+            <a:r>
+              <a:rPr lang="nl-NL" dirty="0"/>
+              <a:t>Gebruiksvriendelijke User Interface</a:t>
+            </a:r>
+          </a:p>
+          <a:p>
+            <a:r>
+              <a:rPr lang="nl-NL" dirty="0"/>
+              <a:t>Kostenefficiënt</a:t>
+            </a:r>
+          </a:p>
+          <a:p>
+            <a:r>
+              <a:rPr lang="nl-NL" dirty="0"/>
+              <a:t>Support</a:t>
+            </a:r>
+          </a:p>
+          <a:p>
+            <a:r>
+              <a:rPr lang="nl-NL" dirty="0"/>
+              <a:t>Actieve update </a:t>
+            </a:r>
+            <a:r>
+              <a:rPr lang="nl-NL" dirty="0" err="1"/>
+              <a:t>cycle</a:t>
+            </a:r>
+            <a:endParaRPr lang="nl-NL" dirty="0"/>
+          </a:p>
+          <a:p>
+            <a:r>
+              <a:rPr lang="nl-NL"/>
+              <a:t> </a:t>
+            </a:r>
+            <a:endParaRPr lang="nl-NL" dirty="0"/>
+          </a:p>
+        </p:txBody>
+      </p:sp>
+    </p:spTree>
+    <p:extLst>
+      <p:ext uri="{BB962C8B-B14F-4D97-AF65-F5344CB8AC3E}">
+        <p14:creationId xmlns:p14="http://schemas.microsoft.com/office/powerpoint/2010/main" val="3378637087"/>
+      </p:ext>
+    </p:extLst>
+  </p:cSld>
+  <p:clrMapOvr>
+    <a:masterClrMapping/>
+  </p:clrMapOvr>
+</p:sld>
+</file>
+
 <file path=ppt/theme/theme1.xml><?xml version="1.0" encoding="utf-8"?>
 <a:theme xmlns:a="http://schemas.openxmlformats.org/drawingml/2006/main" name="Condensspoor">
   <a:themeElements>

</xml_diff>